<commit_message>
Added CatBoost instead of XGBoost
</commit_message>
<xml_diff>
--- a/clase7/teoria/clase7.pptx
+++ b/clase7/teoria/clase7.pptx
@@ -236,7 +236,7 @@
           <a:p>
             <a:fld id="{D642B323-82A1-7544-9837-FC5DD1BB8A69}" type="datetimeFigureOut">
               <a:rPr lang="es-ES_tradnl" smtClean="0"/>
-              <a:t>21/7/24</a:t>
+              <a:t>3/8/24</a:t>
             </a:fld>
             <a:endParaRPr lang="es-ES_tradnl"/>
           </a:p>
@@ -5202,7 +5202,7 @@
           <a:p>
             <a:fld id="{BBCD4F60-3B00-4DB4-90A4-67F8107A0900}" type="datetime1">
               <a:rPr lang="en-US" smtClean="0"/>
-              <a:t>7/21/24</a:t>
+              <a:t>8/3/24</a:t>
             </a:fld>
             <a:endParaRPr lang="en-US"/>
           </a:p>
@@ -5403,7 +5403,7 @@
           <a:p>
             <a:fld id="{E5C12018-AE0B-45B3-8833-1C61B747ADFD}" type="datetime1">
               <a:rPr lang="en-US" smtClean="0"/>
-              <a:t>7/21/24</a:t>
+              <a:t>8/3/24</a:t>
             </a:fld>
             <a:endParaRPr lang="en-US"/>
           </a:p>
@@ -5616,7 +5616,7 @@
           <a:p>
             <a:fld id="{BC874D72-DF44-407D-AEE5-0273DD00D922}" type="datetime1">
               <a:rPr lang="en-US" smtClean="0"/>
-              <a:t>7/21/24</a:t>
+              <a:t>8/3/24</a:t>
             </a:fld>
             <a:endParaRPr lang="en-US"/>
           </a:p>
@@ -5817,7 +5817,7 @@
           <a:p>
             <a:fld id="{626DE685-1B6F-4D7C-AEF2-C9AD71EC467A}" type="datetime1">
               <a:rPr lang="en-US" smtClean="0"/>
-              <a:t>7/21/24</a:t>
+              <a:t>8/3/24</a:t>
             </a:fld>
             <a:endParaRPr lang="en-US"/>
           </a:p>
@@ -6096,7 +6096,7 @@
           <a:p>
             <a:fld id="{66E20BAB-D1DB-4DC1-908A-9B5E73715905}" type="datetime1">
               <a:rPr lang="en-US" smtClean="0"/>
-              <a:t>7/21/24</a:t>
+              <a:t>8/3/24</a:t>
             </a:fld>
             <a:endParaRPr lang="en-US"/>
           </a:p>
@@ -6371,7 +6371,7 @@
           <a:p>
             <a:fld id="{82D2DD5A-C337-4F22-BED0-547AFC68CFD6}" type="datetime1">
               <a:rPr lang="en-US" smtClean="0"/>
-              <a:t>7/21/24</a:t>
+              <a:t>8/3/24</a:t>
             </a:fld>
             <a:endParaRPr lang="en-US"/>
           </a:p>
@@ -6796,7 +6796,7 @@
           <a:p>
             <a:fld id="{FA38DFBF-4DB8-447F-A740-22B1B0F7DDD8}" type="datetime1">
               <a:rPr lang="en-US" smtClean="0"/>
-              <a:t>7/21/24</a:t>
+              <a:t>8/3/24</a:t>
             </a:fld>
             <a:endParaRPr lang="en-US"/>
           </a:p>
@@ -6941,7 +6941,7 @@
           <a:p>
             <a:fld id="{88812435-B87A-4434-B86A-1406D5D81959}" type="datetime1">
               <a:rPr lang="en-US" smtClean="0"/>
-              <a:t>7/21/24</a:t>
+              <a:t>8/3/24</a:t>
             </a:fld>
             <a:endParaRPr lang="en-US"/>
           </a:p>
@@ -7057,7 +7057,7 @@
           <a:p>
             <a:fld id="{F3B850E0-9242-469C-9FA7-447D7E43FF29}" type="datetime1">
               <a:rPr lang="en-US" smtClean="0"/>
-              <a:t>7/21/24</a:t>
+              <a:t>8/3/24</a:t>
             </a:fld>
             <a:endParaRPr lang="en-US"/>
           </a:p>
@@ -7372,7 +7372,7 @@
           <a:p>
             <a:fld id="{CA9184C1-634B-4D2F-90E1-C39B48114444}" type="datetime1">
               <a:rPr lang="en-US" smtClean="0"/>
-              <a:t>7/21/24</a:t>
+              <a:t>8/3/24</a:t>
             </a:fld>
             <a:endParaRPr lang="en-US"/>
           </a:p>
@@ -7668,7 +7668,7 @@
           <a:p>
             <a:fld id="{602A4FC1-9CCD-4E4B-AB4D-5CAEC19C950B}" type="datetime1">
               <a:rPr lang="en-US" smtClean="0"/>
-              <a:t>7/21/24</a:t>
+              <a:t>8/3/24</a:t>
             </a:fld>
             <a:endParaRPr lang="en-US"/>
           </a:p>
@@ -7911,7 +7911,7 @@
           <a:p>
             <a:fld id="{FBA78304-8938-479D-8111-AA943458A814}" type="datetime1">
               <a:rPr lang="en-US" smtClean="0"/>
-              <a:t>7/21/24</a:t>
+              <a:t>8/3/24</a:t>
             </a:fld>
             <a:endParaRPr lang="en-US"/>
           </a:p>
@@ -11720,7 +11720,7 @@
           </a:ln>
           <a:extLst>
             <a:ext uri="{C572A759-6A51-4108-AA02-DFA0A04FC94B}">
-              <ma14:wrappingTextBoxFlag xmlns:ma14="http://schemas.microsoft.com/office/mac/drawingml/2011/main" xmlns:a14="http://schemas.microsoft.com/office/drawing/2010/main" xmlns:m="http://schemas.openxmlformats.org/officeDocument/2006/math" xmlns="" val="1"/>
+              <ma14:wrappingTextBoxFlag xmlns="" xmlns:m="http://schemas.openxmlformats.org/officeDocument/2006/math" xmlns:a14="http://schemas.microsoft.com/office/drawing/2010/main" xmlns:ma14="http://schemas.microsoft.com/office/mac/drawingml/2011/main" val="1"/>
             </a:ext>
           </a:extLst>
         </p:spPr>
@@ -11778,7 +11778,7 @@
           </a:ln>
           <a:extLst>
             <a:ext uri="{C572A759-6A51-4108-AA02-DFA0A04FC94B}">
-              <ma14:wrappingTextBoxFlag xmlns:ma14="http://schemas.microsoft.com/office/mac/drawingml/2011/main" xmlns:a14="http://schemas.microsoft.com/office/drawing/2010/main" xmlns:m="http://schemas.openxmlformats.org/officeDocument/2006/math" xmlns="" val="1"/>
+              <ma14:wrappingTextBoxFlag xmlns="" xmlns:m="http://schemas.openxmlformats.org/officeDocument/2006/math" xmlns:a14="http://schemas.microsoft.com/office/drawing/2010/main" xmlns:ma14="http://schemas.microsoft.com/office/mac/drawingml/2011/main" val="1"/>
             </a:ext>
           </a:extLst>
         </p:spPr>
@@ -11828,7 +11828,7 @@
           </a:ln>
           <a:extLst>
             <a:ext uri="{C572A759-6A51-4108-AA02-DFA0A04FC94B}">
-              <ma14:wrappingTextBoxFlag xmlns:ma14="http://schemas.microsoft.com/office/mac/drawingml/2011/main" xmlns:a14="http://schemas.microsoft.com/office/drawing/2010/main" xmlns:m="http://schemas.openxmlformats.org/officeDocument/2006/math" xmlns="" val="1"/>
+              <ma14:wrappingTextBoxFlag xmlns="" xmlns:m="http://schemas.openxmlformats.org/officeDocument/2006/math" xmlns:a14="http://schemas.microsoft.com/office/drawing/2010/main" xmlns:ma14="http://schemas.microsoft.com/office/mac/drawingml/2011/main" val="1"/>
             </a:ext>
           </a:extLst>
         </p:spPr>
@@ -13265,8 +13265,8 @@
           </a:p>
         </p:txBody>
       </p:sp>
-      <mc:AlternateContent xmlns:mc="http://schemas.openxmlformats.org/markup-compatibility/2006">
-        <mc:Choice xmlns:a14="http://schemas.microsoft.com/office/drawing/2010/main" Requires="a14">
+      <mc:AlternateContent xmlns:mc="http://schemas.openxmlformats.org/markup-compatibility/2006" xmlns:a14="http://schemas.microsoft.com/office/drawing/2010/main">
+        <mc:Choice Requires="a14">
           <p:sp>
             <p:nvSpPr>
               <p:cNvPr id="4" name="Content Placeholder 3">
@@ -13590,7 +13590,7 @@
             </p:txBody>
           </p:sp>
         </mc:Choice>
-        <mc:Fallback>
+        <mc:Fallback xmlns="">
           <p:sp>
             <p:nvSpPr>
               <p:cNvPr id="4" name="Content Placeholder 3">
@@ -13780,8 +13780,8 @@
           </a:p>
         </p:txBody>
       </p:sp>
-      <mc:AlternateContent xmlns:mc="http://schemas.openxmlformats.org/markup-compatibility/2006">
-        <mc:Choice xmlns:a14="http://schemas.microsoft.com/office/drawing/2010/main" Requires="a14">
+      <mc:AlternateContent xmlns:mc="http://schemas.openxmlformats.org/markup-compatibility/2006" xmlns:a14="http://schemas.microsoft.com/office/drawing/2010/main">
+        <mc:Choice Requires="a14">
           <p:sp>
             <p:nvSpPr>
               <p:cNvPr id="4" name="Content Placeholder 3">
@@ -14105,7 +14105,7 @@
             </p:txBody>
           </p:sp>
         </mc:Choice>
-        <mc:Fallback>
+        <mc:Fallback xmlns="">
           <p:sp>
             <p:nvSpPr>
               <p:cNvPr id="4" name="Content Placeholder 3">
@@ -15196,8 +15196,8 @@
           </a:p>
         </p:txBody>
       </p:sp>
-      <mc:AlternateContent xmlns:mc="http://schemas.openxmlformats.org/markup-compatibility/2006">
-        <mc:Choice xmlns:a14="http://schemas.microsoft.com/office/drawing/2010/main" Requires="a14">
+      <mc:AlternateContent xmlns:mc="http://schemas.openxmlformats.org/markup-compatibility/2006" xmlns:a14="http://schemas.microsoft.com/office/drawing/2010/main">
+        <mc:Choice Requires="a14">
           <p:sp>
             <p:nvSpPr>
               <p:cNvPr id="4" name="Content Placeholder 3">
@@ -16271,7 +16271,7 @@
             </p:txBody>
           </p:sp>
         </mc:Choice>
-        <mc:Fallback>
+        <mc:Fallback xmlns="">
           <p:sp>
             <p:nvSpPr>
               <p:cNvPr id="4" name="Content Placeholder 3">
@@ -17960,8 +17960,8 @@
           </a:p>
         </p:txBody>
       </p:sp>
-      <mc:AlternateContent xmlns:mc="http://schemas.openxmlformats.org/markup-compatibility/2006">
-        <mc:Choice xmlns:a14="http://schemas.microsoft.com/office/drawing/2010/main" Requires="a14">
+      <mc:AlternateContent xmlns:mc="http://schemas.openxmlformats.org/markup-compatibility/2006" xmlns:a14="http://schemas.microsoft.com/office/drawing/2010/main">
+        <mc:Choice Requires="a14">
           <p:sp>
             <p:nvSpPr>
               <p:cNvPr id="4" name="Content Placeholder 3">
@@ -18278,7 +18278,7 @@
             </p:txBody>
           </p:sp>
         </mc:Choice>
-        <mc:Fallback>
+        <mc:Fallback xmlns="">
           <p:sp>
             <p:nvSpPr>
               <p:cNvPr id="4" name="Content Placeholder 3">
@@ -21596,7 +21596,7 @@
             </a:pPr>
             <a:r>
               <a:rPr lang="es-ES" sz="2400" dirty="0"/>
-              <a:t>Una implementación famosa es </a:t>
+              <a:t>Tres implementaciones famosas son </a:t>
             </a:r>
             <a:r>
               <a:rPr lang="es-ES" sz="2400" dirty="0">
@@ -21606,8 +21606,25 @@
             </a:r>
             <a:r>
               <a:rPr lang="es-ES" sz="2400" dirty="0"/>
-              <a:t>.</a:t>
-            </a:r>
+              <a:t>, </a:t>
+            </a:r>
+            <a:r>
+              <a:rPr lang="es-ES" sz="2400" dirty="0" err="1">
+                <a:hlinkClick r:id="rId4"/>
+              </a:rPr>
+              <a:t>LightGBM</a:t>
+            </a:r>
+            <a:r>
+              <a:rPr lang="es-ES" sz="2400" dirty="0"/>
+              <a:t> y </a:t>
+            </a:r>
+            <a:r>
+              <a:rPr lang="es-ES" sz="2400" dirty="0" err="1">
+                <a:hlinkClick r:id="rId5"/>
+              </a:rPr>
+              <a:t>CatBoost</a:t>
+            </a:r>
+            <a:endParaRPr lang="es-ES" sz="2400" dirty="0"/>
           </a:p>
         </p:txBody>
       </p:sp>
@@ -22290,8 +22307,8 @@
             </a:p>
           </p:txBody>
         </p:sp>
-        <mc:AlternateContent xmlns:mc="http://schemas.openxmlformats.org/markup-compatibility/2006">
-          <mc:Choice xmlns:a14="http://schemas.microsoft.com/office/drawing/2010/main" Requires="a14">
+        <mc:AlternateContent xmlns:mc="http://schemas.openxmlformats.org/markup-compatibility/2006" xmlns:a14="http://schemas.microsoft.com/office/drawing/2010/main">
+          <mc:Choice Requires="a14">
             <p:sp>
               <p:nvSpPr>
                 <p:cNvPr id="17" name="TextBox 16">
@@ -22382,6 +22399,7 @@
                           </a:solidFill>
                           <a:effectLst/>
                           <a:uFillTx/>
+                          <a:latin typeface="Cambria Math" panose="02040503050406030204" pitchFamily="18" charset="0"/>
                           <a:sym typeface="Graphik Compact Regular"/>
                         </a:rPr>
                         <m:t>𝐹</m:t>
@@ -22396,6 +22414,7 @@
                           </a:solidFill>
                           <a:effectLst/>
                           <a:uFillTx/>
+                          <a:latin typeface="Cambria Math" panose="02040503050406030204" pitchFamily="18" charset="0"/>
                           <a:sym typeface="Graphik Compact Regular"/>
                         </a:rPr>
                         <m:t>=</m:t>
@@ -22412,6 +22431,7 @@
                               </a:solidFill>
                               <a:effectLst/>
                               <a:uFillTx/>
+                              <a:latin typeface="Cambria Math" panose="02040503050406030204" pitchFamily="18" charset="0"/>
                               <a:sym typeface="Graphik Compact Regular"/>
                             </a:rPr>
                           </m:ctrlPr>
@@ -22427,6 +22447,7 @@
                               </a:solidFill>
                               <a:effectLst/>
                               <a:uFillTx/>
+                              <a:latin typeface="Cambria Math" panose="02040503050406030204" pitchFamily="18" charset="0"/>
                               <a:ea typeface="Cambria Math" panose="02040503050406030204" pitchFamily="18" charset="0"/>
                               <a:sym typeface="Graphik Compact Regular"/>
                             </a:rPr>
@@ -22444,6 +22465,7 @@
                               </a:solidFill>
                               <a:effectLst/>
                               <a:uFillTx/>
+                              <a:latin typeface="Cambria Math" panose="02040503050406030204" pitchFamily="18" charset="0"/>
                               <a:sym typeface="Graphik Compact Regular"/>
                             </a:rPr>
                             <m:t>1</m:t>
@@ -22462,6 +22484,7 @@
                               </a:solidFill>
                               <a:effectLst/>
                               <a:uFillTx/>
+                              <a:latin typeface="Cambria Math" panose="02040503050406030204" pitchFamily="18" charset="0"/>
                               <a:sym typeface="Graphik Compact Regular"/>
                             </a:rPr>
                           </m:ctrlPr>
@@ -22477,6 +22500,7 @@
                               </a:solidFill>
                               <a:effectLst/>
                               <a:uFillTx/>
+                              <a:latin typeface="Cambria Math" panose="02040503050406030204" pitchFamily="18" charset="0"/>
                               <a:sym typeface="Graphik Compact Regular"/>
                             </a:rPr>
                             <m:t>𝑓</m:t>
@@ -22493,6 +22517,7 @@
                               </a:solidFill>
                               <a:effectLst/>
                               <a:uFillTx/>
+                              <a:latin typeface="Cambria Math" panose="02040503050406030204" pitchFamily="18" charset="0"/>
                               <a:sym typeface="Graphik Compact Regular"/>
                             </a:rPr>
                             <m:t>1</m:t>
@@ -22516,7 +22541,7 @@
               </p:txBody>
             </p:sp>
           </mc:Choice>
-          <mc:Fallback>
+          <mc:Fallback xmlns="">
             <p:sp>
               <p:nvSpPr>
                 <p:cNvPr id="17" name="TextBox 16">
@@ -22566,8 +22591,8 @@
             </p:sp>
           </mc:Fallback>
         </mc:AlternateContent>
-        <mc:AlternateContent xmlns:mc="http://schemas.openxmlformats.org/markup-compatibility/2006">
-          <mc:Choice xmlns:a14="http://schemas.microsoft.com/office/drawing/2010/main" Requires="a14">
+        <mc:AlternateContent xmlns:mc="http://schemas.openxmlformats.org/markup-compatibility/2006" xmlns:a14="http://schemas.microsoft.com/office/drawing/2010/main">
+          <mc:Choice Requires="a14">
             <p:sp>
               <p:nvSpPr>
                 <p:cNvPr id="18" name="TextBox 17">
@@ -22640,6 +22665,7 @@
                           </a:solidFill>
                           <a:effectLst/>
                           <a:uFillTx/>
+                          <a:latin typeface="Cambria Math" panose="02040503050406030204" pitchFamily="18" charset="0"/>
                           <a:sym typeface="Graphik Compact Regular"/>
                         </a:rPr>
                         <m:t>𝐹</m:t>
@@ -22654,6 +22680,7 @@
                           </a:solidFill>
                           <a:effectLst/>
                           <a:uFillTx/>
+                          <a:latin typeface="Cambria Math" panose="02040503050406030204" pitchFamily="18" charset="0"/>
                           <a:sym typeface="Graphik Compact Regular"/>
                         </a:rPr>
                         <m:t>=</m:t>
@@ -22670,6 +22697,7 @@
                               </a:solidFill>
                               <a:effectLst/>
                               <a:uFillTx/>
+                              <a:latin typeface="Cambria Math" panose="02040503050406030204" pitchFamily="18" charset="0"/>
                               <a:sym typeface="Graphik Compact Regular"/>
                             </a:rPr>
                           </m:ctrlPr>
@@ -22685,6 +22713,7 @@
                               </a:solidFill>
                               <a:effectLst/>
                               <a:uFillTx/>
+                              <a:latin typeface="Cambria Math" panose="02040503050406030204" pitchFamily="18" charset="0"/>
                               <a:ea typeface="Cambria Math" panose="02040503050406030204" pitchFamily="18" charset="0"/>
                               <a:sym typeface="Graphik Compact Regular"/>
                             </a:rPr>
@@ -22702,6 +22731,7 @@
                               </a:solidFill>
                               <a:effectLst/>
                               <a:uFillTx/>
+                              <a:latin typeface="Cambria Math" panose="02040503050406030204" pitchFamily="18" charset="0"/>
                               <a:sym typeface="Graphik Compact Regular"/>
                             </a:rPr>
                             <m:t>1</m:t>
@@ -22720,6 +22750,7 @@
                               </a:solidFill>
                               <a:effectLst/>
                               <a:uFillTx/>
+                              <a:latin typeface="Cambria Math" panose="02040503050406030204" pitchFamily="18" charset="0"/>
                               <a:sym typeface="Graphik Compact Regular"/>
                             </a:rPr>
                           </m:ctrlPr>
@@ -22735,6 +22766,7 @@
                               </a:solidFill>
                               <a:effectLst/>
                               <a:uFillTx/>
+                              <a:latin typeface="Cambria Math" panose="02040503050406030204" pitchFamily="18" charset="0"/>
                               <a:sym typeface="Graphik Compact Regular"/>
                             </a:rPr>
                             <m:t>𝑓</m:t>
@@ -22751,6 +22783,7 @@
                               </a:solidFill>
                               <a:effectLst/>
                               <a:uFillTx/>
+                              <a:latin typeface="Cambria Math" panose="02040503050406030204" pitchFamily="18" charset="0"/>
                               <a:sym typeface="Graphik Compact Regular"/>
                             </a:rPr>
                             <m:t>1</m:t>
@@ -22767,6 +22800,7 @@
                           </a:solidFill>
                           <a:effectLst/>
                           <a:uFillTx/>
+                          <a:latin typeface="Cambria Math" panose="02040503050406030204" pitchFamily="18" charset="0"/>
                           <a:sym typeface="Graphik Compact Regular"/>
                         </a:rPr>
                         <m:t>+</m:t>
@@ -22774,12 +22808,15 @@
                       <m:sSub>
                         <m:sSubPr>
                           <m:ctrlPr>
-                            <a:rPr lang="en-US" sz="1600" i="1"/>
+                            <a:rPr lang="en-US" sz="1600" i="1">
+                              <a:latin typeface="Cambria Math" panose="02040503050406030204" pitchFamily="18" charset="0"/>
+                            </a:rPr>
                           </m:ctrlPr>
                         </m:sSubPr>
                         <m:e>
                           <m:r>
                             <a:rPr lang="en-US" sz="1600" i="1">
+                              <a:latin typeface="Cambria Math" panose="02040503050406030204" pitchFamily="18" charset="0"/>
                               <a:ea typeface="Cambria Math" panose="02040503050406030204" pitchFamily="18" charset="0"/>
                             </a:rPr>
                             <m:t>𝛼</m:t>
@@ -22788,6 +22825,7 @@
                         <m:sub>
                           <m:r>
                             <a:rPr lang="en-US" sz="1600" b="0" i="1" smtClean="0">
+                              <a:latin typeface="Cambria Math" panose="02040503050406030204" pitchFamily="18" charset="0"/>
                               <a:ea typeface="Cambria Math" panose="02040503050406030204" pitchFamily="18" charset="0"/>
                             </a:rPr>
                             <m:t>2</m:t>
@@ -22797,18 +22835,24 @@
                       <m:sSub>
                         <m:sSubPr>
                           <m:ctrlPr>
-                            <a:rPr lang="en-US" sz="1600" i="1"/>
+                            <a:rPr lang="en-US" sz="1600" i="1">
+                              <a:latin typeface="Cambria Math" panose="02040503050406030204" pitchFamily="18" charset="0"/>
+                            </a:rPr>
                           </m:ctrlPr>
                         </m:sSubPr>
                         <m:e>
                           <m:r>
-                            <a:rPr lang="en-US" sz="1600" i="1"/>
+                            <a:rPr lang="en-US" sz="1600" i="1">
+                              <a:latin typeface="Cambria Math" panose="02040503050406030204" pitchFamily="18" charset="0"/>
+                            </a:rPr>
                             <m:t>𝑓</m:t>
                           </m:r>
                         </m:e>
                         <m:sub>
                           <m:r>
-                            <a:rPr lang="en-US" sz="1600" b="0" i="1" smtClean="0"/>
+                            <a:rPr lang="en-US" sz="1600" b="0" i="1" smtClean="0">
+                              <a:latin typeface="Cambria Math" panose="02040503050406030204" pitchFamily="18" charset="0"/>
+                            </a:rPr>
                             <m:t>2</m:t>
                           </m:r>
                         </m:sub>
@@ -22830,7 +22874,7 @@
               </p:txBody>
             </p:sp>
           </mc:Choice>
-          <mc:Fallback>
+          <mc:Fallback xmlns="">
             <p:sp>
               <p:nvSpPr>
                 <p:cNvPr id="18" name="TextBox 17">
@@ -22880,8 +22924,8 @@
             </p:sp>
           </mc:Fallback>
         </mc:AlternateContent>
-        <mc:AlternateContent xmlns:mc="http://schemas.openxmlformats.org/markup-compatibility/2006">
-          <mc:Choice xmlns:a14="http://schemas.microsoft.com/office/drawing/2010/main" Requires="a14">
+        <mc:AlternateContent xmlns:mc="http://schemas.openxmlformats.org/markup-compatibility/2006" xmlns:a14="http://schemas.microsoft.com/office/drawing/2010/main">
+          <mc:Choice Requires="a14">
             <p:sp>
               <p:nvSpPr>
                 <p:cNvPr id="19" name="TextBox 18">
@@ -22954,6 +22998,7 @@
                           </a:solidFill>
                           <a:effectLst/>
                           <a:uFillTx/>
+                          <a:latin typeface="Cambria Math" panose="02040503050406030204" pitchFamily="18" charset="0"/>
                           <a:sym typeface="Graphik Compact Regular"/>
                         </a:rPr>
                         <m:t>𝐹</m:t>
@@ -22968,6 +23013,7 @@
                           </a:solidFill>
                           <a:effectLst/>
                           <a:uFillTx/>
+                          <a:latin typeface="Cambria Math" panose="02040503050406030204" pitchFamily="18" charset="0"/>
                           <a:sym typeface="Graphik Compact Regular"/>
                         </a:rPr>
                         <m:t>=</m:t>
@@ -22984,6 +23030,7 @@
                               </a:solidFill>
                               <a:effectLst/>
                               <a:uFillTx/>
+                              <a:latin typeface="Cambria Math" panose="02040503050406030204" pitchFamily="18" charset="0"/>
                               <a:sym typeface="Graphik Compact Regular"/>
                             </a:rPr>
                           </m:ctrlPr>
@@ -22999,6 +23046,7 @@
                               </a:solidFill>
                               <a:effectLst/>
                               <a:uFillTx/>
+                              <a:latin typeface="Cambria Math" panose="02040503050406030204" pitchFamily="18" charset="0"/>
                               <a:ea typeface="Cambria Math" panose="02040503050406030204" pitchFamily="18" charset="0"/>
                               <a:sym typeface="Graphik Compact Regular"/>
                             </a:rPr>
@@ -23016,6 +23064,7 @@
                               </a:solidFill>
                               <a:effectLst/>
                               <a:uFillTx/>
+                              <a:latin typeface="Cambria Math" panose="02040503050406030204" pitchFamily="18" charset="0"/>
                               <a:sym typeface="Graphik Compact Regular"/>
                             </a:rPr>
                             <m:t>1</m:t>
@@ -23034,6 +23083,7 @@
                               </a:solidFill>
                               <a:effectLst/>
                               <a:uFillTx/>
+                              <a:latin typeface="Cambria Math" panose="02040503050406030204" pitchFamily="18" charset="0"/>
                               <a:sym typeface="Graphik Compact Regular"/>
                             </a:rPr>
                           </m:ctrlPr>
@@ -23049,6 +23099,7 @@
                               </a:solidFill>
                               <a:effectLst/>
                               <a:uFillTx/>
+                              <a:latin typeface="Cambria Math" panose="02040503050406030204" pitchFamily="18" charset="0"/>
                               <a:sym typeface="Graphik Compact Regular"/>
                             </a:rPr>
                             <m:t>𝑓</m:t>
@@ -23065,6 +23116,7 @@
                               </a:solidFill>
                               <a:effectLst/>
                               <a:uFillTx/>
+                              <a:latin typeface="Cambria Math" panose="02040503050406030204" pitchFamily="18" charset="0"/>
                               <a:sym typeface="Graphik Compact Regular"/>
                             </a:rPr>
                             <m:t>1</m:t>
@@ -23081,6 +23133,7 @@
                           </a:solidFill>
                           <a:effectLst/>
                           <a:uFillTx/>
+                          <a:latin typeface="Cambria Math" panose="02040503050406030204" pitchFamily="18" charset="0"/>
                           <a:sym typeface="Graphik Compact Regular"/>
                         </a:rPr>
                         <m:t>+</m:t>
@@ -23088,12 +23141,15 @@
                       <m:sSub>
                         <m:sSubPr>
                           <m:ctrlPr>
-                            <a:rPr lang="en-US" sz="1600" i="1"/>
+                            <a:rPr lang="en-US" sz="1600" i="1">
+                              <a:latin typeface="Cambria Math" panose="02040503050406030204" pitchFamily="18" charset="0"/>
+                            </a:rPr>
                           </m:ctrlPr>
                         </m:sSubPr>
                         <m:e>
                           <m:r>
                             <a:rPr lang="en-US" sz="1600" i="1">
+                              <a:latin typeface="Cambria Math" panose="02040503050406030204" pitchFamily="18" charset="0"/>
                               <a:ea typeface="Cambria Math" panose="02040503050406030204" pitchFamily="18" charset="0"/>
                             </a:rPr>
                             <m:t>𝛼</m:t>
@@ -23102,6 +23158,7 @@
                         <m:sub>
                           <m:r>
                             <a:rPr lang="en-US" sz="1600" b="0" i="1" smtClean="0">
+                              <a:latin typeface="Cambria Math" panose="02040503050406030204" pitchFamily="18" charset="0"/>
                               <a:ea typeface="Cambria Math" panose="02040503050406030204" pitchFamily="18" charset="0"/>
                             </a:rPr>
                             <m:t>2</m:t>
@@ -23111,35 +23168,46 @@
                       <m:sSub>
                         <m:sSubPr>
                           <m:ctrlPr>
-                            <a:rPr lang="en-US" sz="1600" i="1"/>
+                            <a:rPr lang="en-US" sz="1600" i="1">
+                              <a:latin typeface="Cambria Math" panose="02040503050406030204" pitchFamily="18" charset="0"/>
+                            </a:rPr>
                           </m:ctrlPr>
                         </m:sSubPr>
                         <m:e>
                           <m:r>
-                            <a:rPr lang="en-US" sz="1600" i="1"/>
+                            <a:rPr lang="en-US" sz="1600" i="1">
+                              <a:latin typeface="Cambria Math" panose="02040503050406030204" pitchFamily="18" charset="0"/>
+                            </a:rPr>
                             <m:t>𝑓</m:t>
                           </m:r>
                         </m:e>
                         <m:sub>
                           <m:r>
-                            <a:rPr lang="en-US" sz="1600" b="0" i="1" smtClean="0"/>
+                            <a:rPr lang="en-US" sz="1600" b="0" i="1" smtClean="0">
+                              <a:latin typeface="Cambria Math" panose="02040503050406030204" pitchFamily="18" charset="0"/>
+                            </a:rPr>
                             <m:t>2</m:t>
                           </m:r>
                         </m:sub>
                       </m:sSub>
                       <m:r>
-                        <a:rPr lang="en-US" sz="1600" i="1"/>
+                        <a:rPr lang="en-US" sz="1600" i="1">
+                          <a:latin typeface="Cambria Math" panose="02040503050406030204" pitchFamily="18" charset="0"/>
+                        </a:rPr>
                         <m:t>+</m:t>
                       </m:r>
                       <m:sSub>
                         <m:sSubPr>
                           <m:ctrlPr>
-                            <a:rPr lang="en-US" sz="1600" i="1"/>
+                            <a:rPr lang="en-US" sz="1600" i="1">
+                              <a:latin typeface="Cambria Math" panose="02040503050406030204" pitchFamily="18" charset="0"/>
+                            </a:rPr>
                           </m:ctrlPr>
                         </m:sSubPr>
                         <m:e>
                           <m:r>
                             <a:rPr lang="en-US" sz="1600" i="1">
+                              <a:latin typeface="Cambria Math" panose="02040503050406030204" pitchFamily="18" charset="0"/>
                               <a:ea typeface="Cambria Math" panose="02040503050406030204" pitchFamily="18" charset="0"/>
                             </a:rPr>
                             <m:t>𝛼</m:t>
@@ -23148,6 +23216,7 @@
                         <m:sub>
                           <m:r>
                             <a:rPr lang="en-US" sz="1600" b="0" i="1" smtClean="0">
+                              <a:latin typeface="Cambria Math" panose="02040503050406030204" pitchFamily="18" charset="0"/>
                               <a:ea typeface="Cambria Math" panose="02040503050406030204" pitchFamily="18" charset="0"/>
                             </a:rPr>
                             <m:t>3</m:t>
@@ -23157,18 +23226,24 @@
                       <m:sSub>
                         <m:sSubPr>
                           <m:ctrlPr>
-                            <a:rPr lang="en-US" sz="1600" i="1"/>
+                            <a:rPr lang="en-US" sz="1600" i="1">
+                              <a:latin typeface="Cambria Math" panose="02040503050406030204" pitchFamily="18" charset="0"/>
+                            </a:rPr>
                           </m:ctrlPr>
                         </m:sSubPr>
                         <m:e>
                           <m:r>
-                            <a:rPr lang="en-US" sz="1600" i="1"/>
+                            <a:rPr lang="en-US" sz="1600" i="1">
+                              <a:latin typeface="Cambria Math" panose="02040503050406030204" pitchFamily="18" charset="0"/>
+                            </a:rPr>
                             <m:t>𝑓</m:t>
                           </m:r>
                         </m:e>
                         <m:sub>
                           <m:r>
-                            <a:rPr lang="en-US" sz="1600" b="0" i="1" smtClean="0"/>
+                            <a:rPr lang="en-US" sz="1600" b="0" i="1" smtClean="0">
+                              <a:latin typeface="Cambria Math" panose="02040503050406030204" pitchFamily="18" charset="0"/>
+                            </a:rPr>
                             <m:t>3</m:t>
                           </m:r>
                         </m:sub>
@@ -23190,7 +23265,7 @@
               </p:txBody>
             </p:sp>
           </mc:Choice>
-          <mc:Fallback>
+          <mc:Fallback xmlns="">
             <p:sp>
               <p:nvSpPr>
                 <p:cNvPr id="19" name="TextBox 18">
@@ -23240,8 +23315,8 @@
             </p:sp>
           </mc:Fallback>
         </mc:AlternateContent>
-        <mc:AlternateContent xmlns:mc="http://schemas.openxmlformats.org/markup-compatibility/2006">
-          <mc:Choice xmlns:a14="http://schemas.microsoft.com/office/drawing/2010/main" Requires="a14">
+        <mc:AlternateContent xmlns:mc="http://schemas.openxmlformats.org/markup-compatibility/2006" xmlns:a14="http://schemas.microsoft.com/office/drawing/2010/main">
+          <mc:Choice Requires="a14">
             <p:sp>
               <p:nvSpPr>
                 <p:cNvPr id="20" name="TextBox 19">
@@ -23359,7 +23434,7 @@
               </p:txBody>
             </p:sp>
           </mc:Choice>
-          <mc:Fallback>
+          <mc:Fallback xmlns="">
             <p:sp>
               <p:nvSpPr>
                 <p:cNvPr id="20" name="TextBox 19">
@@ -23409,8 +23484,8 @@
             </p:sp>
           </mc:Fallback>
         </mc:AlternateContent>
-        <mc:AlternateContent xmlns:mc="http://schemas.openxmlformats.org/markup-compatibility/2006">
-          <mc:Choice xmlns:a14="http://schemas.microsoft.com/office/drawing/2010/main" Requires="a14">
+        <mc:AlternateContent xmlns:mc="http://schemas.openxmlformats.org/markup-compatibility/2006" xmlns:a14="http://schemas.microsoft.com/office/drawing/2010/main">
+          <mc:Choice Requires="a14">
             <p:sp>
               <p:nvSpPr>
                 <p:cNvPr id="21" name="TextBox 20">
@@ -23528,7 +23603,7 @@
               </p:txBody>
             </p:sp>
           </mc:Choice>
-          <mc:Fallback>
+          <mc:Fallback xmlns="">
             <p:sp>
               <p:nvSpPr>
                 <p:cNvPr id="21" name="TextBox 20">
@@ -23578,8 +23653,8 @@
             </p:sp>
           </mc:Fallback>
         </mc:AlternateContent>
-        <mc:AlternateContent xmlns:mc="http://schemas.openxmlformats.org/markup-compatibility/2006">
-          <mc:Choice xmlns:a14="http://schemas.microsoft.com/office/drawing/2010/main" Requires="a14">
+        <mc:AlternateContent xmlns:mc="http://schemas.openxmlformats.org/markup-compatibility/2006" xmlns:a14="http://schemas.microsoft.com/office/drawing/2010/main">
+          <mc:Choice Requires="a14">
             <p:sp>
               <p:nvSpPr>
                 <p:cNvPr id="22" name="TextBox 21">
@@ -23697,7 +23772,7 @@
               </p:txBody>
             </p:sp>
           </mc:Choice>
-          <mc:Fallback>
+          <mc:Fallback xmlns="">
             <p:sp>
               <p:nvSpPr>
                 <p:cNvPr id="22" name="TextBox 21">
@@ -23747,8 +23822,8 @@
             </p:sp>
           </mc:Fallback>
         </mc:AlternateContent>
-        <mc:AlternateContent xmlns:mc="http://schemas.openxmlformats.org/markup-compatibility/2006">
-          <mc:Choice xmlns:a14="http://schemas.microsoft.com/office/drawing/2010/main" Requires="a14">
+        <mc:AlternateContent xmlns:mc="http://schemas.openxmlformats.org/markup-compatibility/2006" xmlns:a14="http://schemas.microsoft.com/office/drawing/2010/main">
+          <mc:Choice Requires="a14">
             <p:sp>
               <p:nvSpPr>
                 <p:cNvPr id="23" name="TextBox 22">
@@ -23883,7 +23958,7 @@
               </p:txBody>
             </p:sp>
           </mc:Choice>
-          <mc:Fallback>
+          <mc:Fallback xmlns="">
             <p:sp>
               <p:nvSpPr>
                 <p:cNvPr id="23" name="TextBox 22">
@@ -23933,8 +24008,8 @@
             </p:sp>
           </mc:Fallback>
         </mc:AlternateContent>
-        <mc:AlternateContent xmlns:mc="http://schemas.openxmlformats.org/markup-compatibility/2006">
-          <mc:Choice xmlns:a14="http://schemas.microsoft.com/office/drawing/2010/main" Requires="a14">
+        <mc:AlternateContent xmlns:mc="http://schemas.openxmlformats.org/markup-compatibility/2006" xmlns:a14="http://schemas.microsoft.com/office/drawing/2010/main">
+          <mc:Choice Requires="a14">
             <p:sp>
               <p:nvSpPr>
                 <p:cNvPr id="24" name="TextBox 23">
@@ -24148,7 +24223,7 @@
               </p:txBody>
             </p:sp>
           </mc:Choice>
-          <mc:Fallback>
+          <mc:Fallback xmlns="">
             <p:sp>
               <p:nvSpPr>
                 <p:cNvPr id="24" name="TextBox 23">
@@ -24198,8 +24273,8 @@
             </p:sp>
           </mc:Fallback>
         </mc:AlternateContent>
-        <mc:AlternateContent xmlns:mc="http://schemas.openxmlformats.org/markup-compatibility/2006">
-          <mc:Choice xmlns:a14="http://schemas.microsoft.com/office/drawing/2010/main" Requires="a14">
+        <mc:AlternateContent xmlns:mc="http://schemas.openxmlformats.org/markup-compatibility/2006" xmlns:a14="http://schemas.microsoft.com/office/drawing/2010/main">
+          <mc:Choice Requires="a14">
             <p:sp>
               <p:nvSpPr>
                 <p:cNvPr id="25" name="TextBox 24">
@@ -24498,7 +24573,7 @@
               </p:txBody>
             </p:sp>
           </mc:Choice>
-          <mc:Fallback>
+          <mc:Fallback xmlns="">
             <p:sp>
               <p:nvSpPr>
                 <p:cNvPr id="25" name="TextBox 24">

</xml_diff>